<commit_message>
Updating support + cleaning weights
</commit_message>
<xml_diff>
--- a/article/text_similarity_support.pptx
+++ b/article/text_similarity_support.pptx
@@ -11,6 +11,7 @@
     <p:sldId id="260" r:id="rId5"/>
     <p:sldId id="261" r:id="rId6"/>
     <p:sldId id="269" r:id="rId7"/>
+    <p:sldId id="270" r:id="rId8"/>
   </p:sldIdLst>
   <p:sldSz cx="12192000" cy="6858000"/>
   <p:notesSz cx="6858000" cy="9144000"/>
@@ -3039,7 +3040,7 @@
           <a:p>
             <a:fld id="{620FD16B-961D-4EA4-9FCA-1A281C5B629E}" type="datetimeFigureOut">
               <a:rPr lang="fr-FR" smtClean="0"/>
-              <a:t>30/05/2020</a:t>
+              <a:t>31/05/2020</a:t>
             </a:fld>
             <a:endParaRPr lang="fr-FR"/>
           </a:p>
@@ -3237,7 +3238,7 @@
           <a:p>
             <a:fld id="{620FD16B-961D-4EA4-9FCA-1A281C5B629E}" type="datetimeFigureOut">
               <a:rPr lang="fr-FR" smtClean="0"/>
-              <a:t>30/05/2020</a:t>
+              <a:t>31/05/2020</a:t>
             </a:fld>
             <a:endParaRPr lang="fr-FR"/>
           </a:p>
@@ -3445,7 +3446,7 @@
           <a:p>
             <a:fld id="{620FD16B-961D-4EA4-9FCA-1A281C5B629E}" type="datetimeFigureOut">
               <a:rPr lang="fr-FR" smtClean="0"/>
-              <a:t>30/05/2020</a:t>
+              <a:t>31/05/2020</a:t>
             </a:fld>
             <a:endParaRPr lang="fr-FR"/>
           </a:p>
@@ -3643,7 +3644,7 @@
           <a:p>
             <a:fld id="{620FD16B-961D-4EA4-9FCA-1A281C5B629E}" type="datetimeFigureOut">
               <a:rPr lang="fr-FR" smtClean="0"/>
-              <a:t>30/05/2020</a:t>
+              <a:t>31/05/2020</a:t>
             </a:fld>
             <a:endParaRPr lang="fr-FR"/>
           </a:p>
@@ -3918,7 +3919,7 @@
           <a:p>
             <a:fld id="{620FD16B-961D-4EA4-9FCA-1A281C5B629E}" type="datetimeFigureOut">
               <a:rPr lang="fr-FR" smtClean="0"/>
-              <a:t>30/05/2020</a:t>
+              <a:t>31/05/2020</a:t>
             </a:fld>
             <a:endParaRPr lang="fr-FR"/>
           </a:p>
@@ -4183,7 +4184,7 @@
           <a:p>
             <a:fld id="{620FD16B-961D-4EA4-9FCA-1A281C5B629E}" type="datetimeFigureOut">
               <a:rPr lang="fr-FR" smtClean="0"/>
-              <a:t>30/05/2020</a:t>
+              <a:t>31/05/2020</a:t>
             </a:fld>
             <a:endParaRPr lang="fr-FR"/>
           </a:p>
@@ -4595,7 +4596,7 @@
           <a:p>
             <a:fld id="{620FD16B-961D-4EA4-9FCA-1A281C5B629E}" type="datetimeFigureOut">
               <a:rPr lang="fr-FR" smtClean="0"/>
-              <a:t>30/05/2020</a:t>
+              <a:t>31/05/2020</a:t>
             </a:fld>
             <a:endParaRPr lang="fr-FR"/>
           </a:p>
@@ -4736,7 +4737,7 @@
           <a:p>
             <a:fld id="{620FD16B-961D-4EA4-9FCA-1A281C5B629E}" type="datetimeFigureOut">
               <a:rPr lang="fr-FR" smtClean="0"/>
-              <a:t>30/05/2020</a:t>
+              <a:t>31/05/2020</a:t>
             </a:fld>
             <a:endParaRPr lang="fr-FR"/>
           </a:p>
@@ -4849,7 +4850,7 @@
           <a:p>
             <a:fld id="{620FD16B-961D-4EA4-9FCA-1A281C5B629E}" type="datetimeFigureOut">
               <a:rPr lang="fr-FR" smtClean="0"/>
-              <a:t>30/05/2020</a:t>
+              <a:t>31/05/2020</a:t>
             </a:fld>
             <a:endParaRPr lang="fr-FR"/>
           </a:p>
@@ -5160,7 +5161,7 @@
           <a:p>
             <a:fld id="{620FD16B-961D-4EA4-9FCA-1A281C5B629E}" type="datetimeFigureOut">
               <a:rPr lang="fr-FR" smtClean="0"/>
-              <a:t>30/05/2020</a:t>
+              <a:t>31/05/2020</a:t>
             </a:fld>
             <a:endParaRPr lang="fr-FR"/>
           </a:p>
@@ -5448,7 +5449,7 @@
           <a:p>
             <a:fld id="{620FD16B-961D-4EA4-9FCA-1A281C5B629E}" type="datetimeFigureOut">
               <a:rPr lang="fr-FR" smtClean="0"/>
-              <a:t>30/05/2020</a:t>
+              <a:t>31/05/2020</a:t>
             </a:fld>
             <a:endParaRPr lang="fr-FR"/>
           </a:p>
@@ -5689,7 +5690,7 @@
           <a:p>
             <a:fld id="{620FD16B-961D-4EA4-9FCA-1A281C5B629E}" type="datetimeFigureOut">
               <a:rPr lang="fr-FR" smtClean="0"/>
-              <a:t>30/05/2020</a:t>
+              <a:t>31/05/2020</a:t>
             </a:fld>
             <a:endParaRPr lang="fr-FR"/>
           </a:p>
@@ -9434,8 +9435,8 @@
           </a:fontRef>
         </p:style>
       </p:cxnSp>
-      <mc:AlternateContent xmlns:mc="http://schemas.openxmlformats.org/markup-compatibility/2006">
-        <mc:Choice xmlns:a14="http://schemas.microsoft.com/office/drawing/2010/main" Requires="a14">
+      <mc:AlternateContent xmlns:mc="http://schemas.openxmlformats.org/markup-compatibility/2006" xmlns:a14="http://schemas.microsoft.com/office/drawing/2010/main">
+        <mc:Choice Requires="a14">
           <p:sp>
             <p:nvSpPr>
               <p:cNvPr id="8" name="ZoneTexte 7">
@@ -9464,6 +9465,7 @@
               </a:bodyPr>
               <a:lstStyle/>
               <a:p>
+                <a:pPr/>
                 <a14:m>
                   <m:oMathPara xmlns:m="http://schemas.openxmlformats.org/officeDocument/2006/math">
                     <m:oMathParaPr>
@@ -9689,7 +9691,7 @@
             </p:txBody>
           </p:sp>
         </mc:Choice>
-        <mc:Fallback>
+        <mc:Fallback xmlns="">
           <p:sp>
             <p:nvSpPr>
               <p:cNvPr id="8" name="ZoneTexte 7">
@@ -9713,7 +9715,7 @@
                 <a:avLst/>
               </a:prstGeom>
               <a:blipFill>
-                <a:blip r:embed="rId2"/>
+                <a:blip r:embed="rId6"/>
                 <a:stretch>
                   <a:fillRect/>
                 </a:stretch>
@@ -9734,8 +9736,8 @@
           </p:sp>
         </mc:Fallback>
       </mc:AlternateContent>
-      <mc:AlternateContent xmlns:mc="http://schemas.openxmlformats.org/markup-compatibility/2006">
-        <mc:Choice xmlns:a14="http://schemas.microsoft.com/office/drawing/2010/main" Requires="a14">
+      <mc:AlternateContent xmlns:mc="http://schemas.openxmlformats.org/markup-compatibility/2006" xmlns:a14="http://schemas.microsoft.com/office/drawing/2010/main">
+        <mc:Choice Requires="a14">
           <p:sp>
             <p:nvSpPr>
               <p:cNvPr id="9" name="ZoneTexte 8">
@@ -9764,6 +9766,7 @@
               </a:bodyPr>
               <a:lstStyle/>
               <a:p>
+                <a:pPr/>
                 <a14:m>
                   <m:oMathPara xmlns:m="http://schemas.openxmlformats.org/officeDocument/2006/math">
                     <m:oMathParaPr>
@@ -10019,7 +10022,7 @@
             </p:txBody>
           </p:sp>
         </mc:Choice>
-        <mc:Fallback>
+        <mc:Fallback xmlns="">
           <p:sp>
             <p:nvSpPr>
               <p:cNvPr id="9" name="ZoneTexte 8">
@@ -10043,7 +10046,7 @@
                 <a:avLst/>
               </a:prstGeom>
               <a:blipFill>
-                <a:blip r:embed="rId3"/>
+                <a:blip r:embed="rId7"/>
                 <a:stretch>
                   <a:fillRect/>
                 </a:stretch>
@@ -10064,8 +10067,8 @@
           </p:sp>
         </mc:Fallback>
       </mc:AlternateContent>
-      <mc:AlternateContent xmlns:mc="http://schemas.openxmlformats.org/markup-compatibility/2006">
-        <mc:Choice xmlns:a14="http://schemas.microsoft.com/office/drawing/2010/main" Requires="a14">
+      <mc:AlternateContent xmlns:mc="http://schemas.openxmlformats.org/markup-compatibility/2006" xmlns:a14="http://schemas.microsoft.com/office/drawing/2010/main">
+        <mc:Choice Requires="a14">
           <p:sp>
             <p:nvSpPr>
               <p:cNvPr id="11" name="ZoneTexte 10">
@@ -10105,7 +10108,7 @@
                     <m:d>
                       <m:dPr>
                         <m:ctrlPr>
-                          <a:rPr lang="en-US" b="0" i="0" smtClean="0">
+                          <a:rPr lang="en-US" b="0" i="1" smtClean="0">
                             <a:latin typeface="Cambria Math" panose="02040503050406030204" pitchFamily="18" charset="0"/>
                           </a:rPr>
                         </m:ctrlPr>
@@ -10779,7 +10782,7 @@
             </p:txBody>
           </p:sp>
         </mc:Choice>
-        <mc:Fallback>
+        <mc:Fallback xmlns="">
           <p:sp>
             <p:nvSpPr>
               <p:cNvPr id="11" name="ZoneTexte 10">
@@ -10803,7 +10806,7 @@
                 <a:avLst/>
               </a:prstGeom>
               <a:blipFill>
-                <a:blip r:embed="rId4"/>
+                <a:blip r:embed="rId8"/>
                 <a:stretch>
                   <a:fillRect l="-465" t="-680"/>
                 </a:stretch>
@@ -10936,8 +10939,8 @@
           <a:chExt cx="0" cy="0"/>
         </a:xfrm>
       </p:grpSpPr>
-      <mc:AlternateContent xmlns:mc="http://schemas.openxmlformats.org/markup-compatibility/2006">
-        <mc:Choice xmlns:a14="http://schemas.microsoft.com/office/drawing/2010/main" Requires="a14">
+      <mc:AlternateContent xmlns:mc="http://schemas.openxmlformats.org/markup-compatibility/2006" xmlns:a14="http://schemas.microsoft.com/office/drawing/2010/main">
+        <mc:Choice Requires="a14">
           <p:sp>
             <p:nvSpPr>
               <p:cNvPr id="11" name="ZoneTexte 10">
@@ -11283,7 +11286,7 @@
             </p:txBody>
           </p:sp>
         </mc:Choice>
-        <mc:Fallback>
+        <mc:Fallback xmlns="">
           <p:sp>
             <p:nvSpPr>
               <p:cNvPr id="11" name="ZoneTexte 10">
@@ -11307,7 +11310,7 @@
                 <a:avLst/>
               </a:prstGeom>
               <a:blipFill>
-                <a:blip r:embed="rId2"/>
+                <a:blip r:embed="rId5"/>
                 <a:stretch>
                   <a:fillRect l="-2199" t="-1984"/>
                 </a:stretch>
@@ -11328,8 +11331,8 @@
           </p:sp>
         </mc:Fallback>
       </mc:AlternateContent>
-      <mc:AlternateContent xmlns:mc="http://schemas.openxmlformats.org/markup-compatibility/2006">
-        <mc:Choice xmlns:a14="http://schemas.microsoft.com/office/drawing/2010/main" Requires="a14">
+      <mc:AlternateContent xmlns:mc="http://schemas.openxmlformats.org/markup-compatibility/2006" xmlns:a14="http://schemas.microsoft.com/office/drawing/2010/main">
+        <mc:Choice Requires="a14">
           <p:sp>
             <p:nvSpPr>
               <p:cNvPr id="10" name="ZoneTexte 9">
@@ -11580,7 +11583,7 @@
             </p:txBody>
           </p:sp>
         </mc:Choice>
-        <mc:Fallback>
+        <mc:Fallback xmlns="">
           <p:sp>
             <p:nvSpPr>
               <p:cNvPr id="10" name="ZoneTexte 9">
@@ -11604,7 +11607,7 @@
                 <a:avLst/>
               </a:prstGeom>
               <a:blipFill>
-                <a:blip r:embed="rId3"/>
+                <a:blip r:embed="rId6"/>
                 <a:stretch>
                   <a:fillRect l="-1879" b="-4555"/>
                 </a:stretch>
@@ -11625,8 +11628,8 @@
           </p:sp>
         </mc:Fallback>
       </mc:AlternateContent>
-      <mc:AlternateContent xmlns:mc="http://schemas.openxmlformats.org/markup-compatibility/2006">
-        <mc:Choice xmlns:a14="http://schemas.microsoft.com/office/drawing/2010/main" Requires="a14">
+      <mc:AlternateContent xmlns:mc="http://schemas.openxmlformats.org/markup-compatibility/2006" xmlns:a14="http://schemas.microsoft.com/office/drawing/2010/main">
+        <mc:Choice Requires="a14">
           <p:sp>
             <p:nvSpPr>
               <p:cNvPr id="2" name="ZoneTexte 1">
@@ -11974,7 +11977,7 @@
             </p:txBody>
           </p:sp>
         </mc:Choice>
-        <mc:Fallback>
+        <mc:Fallback xmlns="">
           <p:sp>
             <p:nvSpPr>
               <p:cNvPr id="2" name="ZoneTexte 1">
@@ -11998,7 +12001,7 @@
                 <a:avLst/>
               </a:prstGeom>
               <a:blipFill>
-                <a:blip r:embed="rId4"/>
+                <a:blip r:embed="rId7"/>
                 <a:stretch>
                   <a:fillRect l="-1064" r="-53" b="-7553"/>
                 </a:stretch>
@@ -12310,8 +12313,8 @@
           </a:p>
         </p:txBody>
       </p:sp>
-      <mc:AlternateContent xmlns:mc="http://schemas.openxmlformats.org/markup-compatibility/2006">
-        <mc:Choice xmlns:a14="http://schemas.microsoft.com/office/drawing/2010/main" Requires="a14">
+      <mc:AlternateContent xmlns:mc="http://schemas.openxmlformats.org/markup-compatibility/2006" xmlns:a14="http://schemas.microsoft.com/office/drawing/2010/main">
+        <mc:Choice Requires="a14">
           <p:sp>
             <p:nvSpPr>
               <p:cNvPr id="13" name="Rectangle : coins arrondis 12">
@@ -12626,7 +12629,7 @@
             </p:txBody>
           </p:sp>
         </mc:Choice>
-        <mc:Fallback>
+        <mc:Fallback xmlns="">
           <p:sp>
             <p:nvSpPr>
               <p:cNvPr id="13" name="Rectangle : coins arrondis 12">
@@ -12650,7 +12653,7 @@
                 <a:avLst/>
               </a:prstGeom>
               <a:blipFill>
-                <a:blip r:embed="rId2"/>
+                <a:blip r:embed="rId15"/>
                 <a:stretch>
                   <a:fillRect/>
                 </a:stretch>
@@ -12762,8 +12765,8 @@
           </a:fontRef>
         </p:style>
       </p:cxnSp>
-      <mc:AlternateContent xmlns:mc="http://schemas.openxmlformats.org/markup-compatibility/2006">
-        <mc:Choice xmlns:a14="http://schemas.microsoft.com/office/drawing/2010/main" Requires="a14">
+      <mc:AlternateContent xmlns:mc="http://schemas.openxmlformats.org/markup-compatibility/2006" xmlns:a14="http://schemas.microsoft.com/office/drawing/2010/main">
+        <mc:Choice Requires="a14">
           <p:sp>
             <p:nvSpPr>
               <p:cNvPr id="22" name="Rectangle : coins arrondis 21">
@@ -12912,7 +12915,7 @@
             </p:txBody>
           </p:sp>
         </mc:Choice>
-        <mc:Fallback>
+        <mc:Fallback xmlns="">
           <p:sp>
             <p:nvSpPr>
               <p:cNvPr id="22" name="Rectangle : coins arrondis 21">
@@ -12936,7 +12939,7 @@
                 <a:avLst/>
               </a:prstGeom>
               <a:blipFill>
-                <a:blip r:embed="rId3"/>
+                <a:blip r:embed="rId16"/>
                 <a:stretch>
                   <a:fillRect/>
                 </a:stretch>
@@ -13001,8 +13004,8 @@
           </a:fontRef>
         </p:style>
       </p:cxnSp>
-      <mc:AlternateContent xmlns:mc="http://schemas.openxmlformats.org/markup-compatibility/2006">
-        <mc:Choice xmlns:a14="http://schemas.microsoft.com/office/drawing/2010/main" Requires="a14">
+      <mc:AlternateContent xmlns:mc="http://schemas.openxmlformats.org/markup-compatibility/2006" xmlns:a14="http://schemas.microsoft.com/office/drawing/2010/main">
+        <mc:Choice Requires="a14">
           <p:sp>
             <p:nvSpPr>
               <p:cNvPr id="33" name="ZoneTexte 32">
@@ -13071,7 +13074,7 @@
             </p:txBody>
           </p:sp>
         </mc:Choice>
-        <mc:Fallback>
+        <mc:Fallback xmlns="">
           <p:sp>
             <p:nvSpPr>
               <p:cNvPr id="33" name="ZoneTexte 32">
@@ -13095,7 +13098,7 @@
                 <a:avLst/>
               </a:prstGeom>
               <a:blipFill>
-                <a:blip r:embed="rId4"/>
+                <a:blip r:embed="rId17"/>
                 <a:stretch>
                   <a:fillRect/>
                 </a:stretch>
@@ -13116,8 +13119,8 @@
           </p:sp>
         </mc:Fallback>
       </mc:AlternateContent>
-      <mc:AlternateContent xmlns:mc="http://schemas.openxmlformats.org/markup-compatibility/2006">
-        <mc:Choice xmlns:a14="http://schemas.microsoft.com/office/drawing/2010/main" Requires="a14">
+      <mc:AlternateContent xmlns:mc="http://schemas.openxmlformats.org/markup-compatibility/2006" xmlns:a14="http://schemas.microsoft.com/office/drawing/2010/main">
+        <mc:Choice Requires="a14">
           <p:sp>
             <p:nvSpPr>
               <p:cNvPr id="34" name="ZoneTexte 33">
@@ -13199,7 +13202,7 @@
             </p:txBody>
           </p:sp>
         </mc:Choice>
-        <mc:Fallback>
+        <mc:Fallback xmlns="">
           <p:sp>
             <p:nvSpPr>
               <p:cNvPr id="34" name="ZoneTexte 33">
@@ -13223,7 +13226,7 @@
                 <a:avLst/>
               </a:prstGeom>
               <a:blipFill>
-                <a:blip r:embed="rId5"/>
+                <a:blip r:embed="rId18"/>
                 <a:stretch>
                   <a:fillRect/>
                 </a:stretch>
@@ -13425,8 +13428,8 @@
           </a:p>
         </p:txBody>
       </p:sp>
-      <mc:AlternateContent xmlns:mc="http://schemas.openxmlformats.org/markup-compatibility/2006">
-        <mc:Choice xmlns:a14="http://schemas.microsoft.com/office/drawing/2010/main" Requires="a14">
+      <mc:AlternateContent xmlns:mc="http://schemas.openxmlformats.org/markup-compatibility/2006" xmlns:a14="http://schemas.microsoft.com/office/drawing/2010/main">
+        <mc:Choice Requires="a14">
           <p:sp>
             <p:nvSpPr>
               <p:cNvPr id="9" name="Rectangle : coins arrondis 8">
@@ -13619,7 +13622,7 @@
             </p:txBody>
           </p:sp>
         </mc:Choice>
-        <mc:Fallback>
+        <mc:Fallback xmlns="">
           <p:sp>
             <p:nvSpPr>
               <p:cNvPr id="9" name="Rectangle : coins arrondis 8">
@@ -13643,7 +13646,7 @@
                 <a:avLst/>
               </a:prstGeom>
               <a:blipFill>
-                <a:blip r:embed="rId6"/>
+                <a:blip r:embed="rId19"/>
                 <a:stretch>
                   <a:fillRect l="-1075"/>
                 </a:stretch>
@@ -13665,8 +13668,8 @@
           </p:sp>
         </mc:Fallback>
       </mc:AlternateContent>
-      <mc:AlternateContent xmlns:mc="http://schemas.openxmlformats.org/markup-compatibility/2006">
-        <mc:Choice xmlns:a14="http://schemas.microsoft.com/office/drawing/2010/main" Requires="a14">
+      <mc:AlternateContent xmlns:mc="http://schemas.openxmlformats.org/markup-compatibility/2006" xmlns:a14="http://schemas.microsoft.com/office/drawing/2010/main">
+        <mc:Choice Requires="a14">
           <p:sp>
             <p:nvSpPr>
               <p:cNvPr id="27" name="Rectangle : coins arrondis 26">
@@ -13847,7 +13850,7 @@
             </p:txBody>
           </p:sp>
         </mc:Choice>
-        <mc:Fallback>
+        <mc:Fallback xmlns="">
           <p:sp>
             <p:nvSpPr>
               <p:cNvPr id="27" name="Rectangle : coins arrondis 26">
@@ -13871,7 +13874,7 @@
                 <a:avLst/>
               </a:prstGeom>
               <a:blipFill>
-                <a:blip r:embed="rId7"/>
+                <a:blip r:embed="rId20"/>
                 <a:stretch>
                   <a:fillRect l="-3784" r="-1622"/>
                 </a:stretch>
@@ -14147,8 +14150,8 @@
           </a:p>
         </p:txBody>
       </p:sp>
-      <mc:AlternateContent xmlns:mc="http://schemas.openxmlformats.org/markup-compatibility/2006">
-        <mc:Choice xmlns:a14="http://schemas.microsoft.com/office/drawing/2010/main" Requires="a14">
+      <mc:AlternateContent xmlns:mc="http://schemas.openxmlformats.org/markup-compatibility/2006" xmlns:a14="http://schemas.microsoft.com/office/drawing/2010/main">
+        <mc:Choice Requires="a14">
           <p:sp>
             <p:nvSpPr>
               <p:cNvPr id="36" name="Rectangle : coins arrondis 35">
@@ -14366,19 +14369,7 @@
                           <a:latin typeface="Cambria Math" panose="02040503050406030204" pitchFamily="18" charset="0"/>
                           <a:ea typeface="Cambria Math" panose="02040503050406030204" pitchFamily="18" charset="0"/>
                         </a:rPr>
-                        <m:t>(⋯)</m:t>
-                      </m:r>
-                      <m:r>
-                        <a:rPr lang="en-US" sz="1400" b="0" i="1" smtClean="0">
-                          <a:solidFill>
-                            <a:schemeClr val="accent2">
-                              <a:lumMod val="50000"/>
-                            </a:schemeClr>
-                          </a:solidFill>
-                          <a:latin typeface="Cambria Math" panose="02040503050406030204" pitchFamily="18" charset="0"/>
-                          <a:ea typeface="Cambria Math" panose="02040503050406030204" pitchFamily="18" charset="0"/>
-                        </a:rPr>
-                        <m:t>)</m:t>
+                        <m:t>(⋯))</m:t>
                       </m:r>
                     </m:oMath>
                   </m:oMathPara>
@@ -14394,7 +14385,7 @@
             </p:txBody>
           </p:sp>
         </mc:Choice>
-        <mc:Fallback>
+        <mc:Fallback xmlns="">
           <p:sp>
             <p:nvSpPr>
               <p:cNvPr id="36" name="Rectangle : coins arrondis 35">
@@ -14418,7 +14409,7 @@
                 <a:avLst/>
               </a:prstGeom>
               <a:blipFill>
-                <a:blip r:embed="rId8"/>
+                <a:blip r:embed="rId21"/>
                 <a:stretch>
                   <a:fillRect l="-3226" r="-538"/>
                 </a:stretch>
@@ -14446,8 +14437,8 @@
           </p:sp>
         </mc:Fallback>
       </mc:AlternateContent>
-      <mc:AlternateContent xmlns:mc="http://schemas.openxmlformats.org/markup-compatibility/2006">
-        <mc:Choice xmlns:a14="http://schemas.microsoft.com/office/drawing/2010/main" Requires="a14">
+      <mc:AlternateContent xmlns:mc="http://schemas.openxmlformats.org/markup-compatibility/2006" xmlns:a14="http://schemas.microsoft.com/office/drawing/2010/main">
+        <mc:Choice Requires="a14">
           <p:sp>
             <p:nvSpPr>
               <p:cNvPr id="37" name="Rectangle : coins arrondis 36">
@@ -14640,7 +14631,7 @@
             </p:txBody>
           </p:sp>
         </mc:Choice>
-        <mc:Fallback>
+        <mc:Fallback xmlns="">
           <p:sp>
             <p:nvSpPr>
               <p:cNvPr id="37" name="Rectangle : coins arrondis 36">
@@ -14664,7 +14655,7 @@
                 <a:avLst/>
               </a:prstGeom>
               <a:blipFill>
-                <a:blip r:embed="rId9"/>
+                <a:blip r:embed="rId22"/>
                 <a:stretch>
                   <a:fillRect l="-1075"/>
                 </a:stretch>
@@ -14686,8 +14677,8 @@
           </p:sp>
         </mc:Fallback>
       </mc:AlternateContent>
-      <mc:AlternateContent xmlns:mc="http://schemas.openxmlformats.org/markup-compatibility/2006">
-        <mc:Choice xmlns:a14="http://schemas.microsoft.com/office/drawing/2010/main" Requires="a14">
+      <mc:AlternateContent xmlns:mc="http://schemas.openxmlformats.org/markup-compatibility/2006" xmlns:a14="http://schemas.microsoft.com/office/drawing/2010/main">
+        <mc:Choice Requires="a14">
           <p:sp>
             <p:nvSpPr>
               <p:cNvPr id="38" name="Rectangle : coins arrondis 37">
@@ -14868,7 +14859,7 @@
             </p:txBody>
           </p:sp>
         </mc:Choice>
-        <mc:Fallback>
+        <mc:Fallback xmlns="">
           <p:sp>
             <p:nvSpPr>
               <p:cNvPr id="38" name="Rectangle : coins arrondis 37">
@@ -14892,7 +14883,7 @@
                 <a:avLst/>
               </a:prstGeom>
               <a:blipFill>
-                <a:blip r:embed="rId10"/>
+                <a:blip r:embed="rId23"/>
                 <a:stretch>
                   <a:fillRect l="-3784" r="-1622"/>
                 </a:stretch>
@@ -14914,8 +14905,8 @@
           </p:sp>
         </mc:Fallback>
       </mc:AlternateContent>
-      <mc:AlternateContent xmlns:mc="http://schemas.openxmlformats.org/markup-compatibility/2006">
-        <mc:Choice xmlns:a14="http://schemas.microsoft.com/office/drawing/2010/main" Requires="a14">
+      <mc:AlternateContent xmlns:mc="http://schemas.openxmlformats.org/markup-compatibility/2006" xmlns:a14="http://schemas.microsoft.com/office/drawing/2010/main">
+        <mc:Choice Requires="a14">
           <p:sp>
             <p:nvSpPr>
               <p:cNvPr id="44" name="Rectangle : coins arrondis 43">
@@ -15178,7 +15169,7 @@
             </p:txBody>
           </p:sp>
         </mc:Choice>
-        <mc:Fallback>
+        <mc:Fallback xmlns="">
           <p:sp>
             <p:nvSpPr>
               <p:cNvPr id="44" name="Rectangle : coins arrondis 43">
@@ -15202,7 +15193,7 @@
                 <a:avLst/>
               </a:prstGeom>
               <a:blipFill>
-                <a:blip r:embed="rId11"/>
+                <a:blip r:embed="rId24"/>
                 <a:stretch>
                   <a:fillRect l="-3226" r="-1075"/>
                 </a:stretch>
@@ -15903,6 +15894,110 @@
 </p:sld>
 </file>
 
+<file path=ppt/slides/slide7.xml><?xml version="1.0" encoding="utf-8"?>
+<p:sld xmlns:a="http://schemas.openxmlformats.org/drawingml/2006/main" xmlns:r="http://schemas.openxmlformats.org/officeDocument/2006/relationships" xmlns:p="http://schemas.openxmlformats.org/presentationml/2006/main">
+  <p:cSld>
+    <p:spTree>
+      <p:nvGrpSpPr>
+        <p:cNvPr id="1" name=""/>
+        <p:cNvGrpSpPr/>
+        <p:nvPr/>
+      </p:nvGrpSpPr>
+      <p:grpSpPr>
+        <a:xfrm>
+          <a:off x="0" y="0"/>
+          <a:ext cx="0" cy="0"/>
+          <a:chOff x="0" y="0"/>
+          <a:chExt cx="0" cy="0"/>
+        </a:xfrm>
+      </p:grpSpPr>
+      <p:sp>
+        <p:nvSpPr>
+          <p:cNvPr id="4" name="ZoneTexte 3">
+            <a:extLst>
+              <a:ext uri="{FF2B5EF4-FFF2-40B4-BE49-F238E27FC236}">
+                <a16:creationId xmlns:a16="http://schemas.microsoft.com/office/drawing/2014/main" id="{E5116766-C0EF-4A78-9C87-7FB0EAC6AEAC}"/>
+              </a:ext>
+            </a:extLst>
+          </p:cNvPr>
+          <p:cNvSpPr txBox="1"/>
+          <p:nvPr/>
+        </p:nvSpPr>
+        <p:spPr>
+          <a:xfrm>
+            <a:off x="0" y="2239561"/>
+            <a:ext cx="3304674" cy="646331"/>
+          </a:xfrm>
+          <a:prstGeom prst="rect">
+            <a:avLst/>
+          </a:prstGeom>
+          <a:noFill/>
+        </p:spPr>
+        <p:txBody>
+          <a:bodyPr wrap="square" rtlCol="0">
+            <a:spAutoFit/>
+          </a:bodyPr>
+          <a:lstStyle/>
+          <a:p>
+            <a:r>
+              <a:rPr lang="en-US" dirty="0">
+                <a:latin typeface="Ubuntu" panose="020B0504030602030204" pitchFamily="34" charset="0"/>
+              </a:rPr>
+              <a:t>How can I be a good geologist?</a:t>
+            </a:r>
+          </a:p>
+        </p:txBody>
+      </p:sp>
+      <p:sp>
+        <p:nvSpPr>
+          <p:cNvPr id="5" name="ZoneTexte 4">
+            <a:extLst>
+              <a:ext uri="{FF2B5EF4-FFF2-40B4-BE49-F238E27FC236}">
+                <a16:creationId xmlns:a16="http://schemas.microsoft.com/office/drawing/2014/main" id="{171709DB-1591-4FFA-98FC-BD75C9372077}"/>
+              </a:ext>
+            </a:extLst>
+          </p:cNvPr>
+          <p:cNvSpPr txBox="1"/>
+          <p:nvPr/>
+        </p:nvSpPr>
+        <p:spPr>
+          <a:xfrm>
+            <a:off x="0" y="3972109"/>
+            <a:ext cx="3304674" cy="646331"/>
+          </a:xfrm>
+          <a:prstGeom prst="rect">
+            <a:avLst/>
+          </a:prstGeom>
+          <a:noFill/>
+        </p:spPr>
+        <p:txBody>
+          <a:bodyPr wrap="square" rtlCol="0">
+            <a:spAutoFit/>
+          </a:bodyPr>
+          <a:lstStyle/>
+          <a:p>
+            <a:r>
+              <a:rPr lang="en-US" dirty="0">
+                <a:latin typeface="Ubuntu" panose="020B0504030602030204" pitchFamily="34" charset="0"/>
+              </a:rPr>
+              <a:t>How can I be a good geologist?</a:t>
+            </a:r>
+          </a:p>
+        </p:txBody>
+      </p:sp>
+    </p:spTree>
+    <p:extLst>
+      <p:ext uri="{BB962C8B-B14F-4D97-AF65-F5344CB8AC3E}">
+        <p14:creationId xmlns:p14="http://schemas.microsoft.com/office/powerpoint/2010/main" val="3197615897"/>
+      </p:ext>
+    </p:extLst>
+  </p:cSld>
+  <p:clrMapOvr>
+    <a:masterClrMapping/>
+  </p:clrMapOvr>
+</p:sld>
+</file>
+
 <file path=ppt/theme/theme1.xml><?xml version="1.0" encoding="utf-8"?>
 <a:theme xmlns:a="http://schemas.openxmlformats.org/drawingml/2006/main" name="Thème Office">
   <a:themeElements>

</xml_diff>

<commit_message>
Adding new losses + new multi-loss Dataset
</commit_message>
<xml_diff>
--- a/article/text_similarity_support.pptx
+++ b/article/text_similarity_support.pptx
@@ -3040,7 +3040,7 @@
           <a:p>
             <a:fld id="{620FD16B-961D-4EA4-9FCA-1A281C5B629E}" type="datetimeFigureOut">
               <a:rPr lang="fr-FR" smtClean="0"/>
-              <a:t>31/05/2020</a:t>
+              <a:t>02/06/2020</a:t>
             </a:fld>
             <a:endParaRPr lang="fr-FR"/>
           </a:p>
@@ -3238,7 +3238,7 @@
           <a:p>
             <a:fld id="{620FD16B-961D-4EA4-9FCA-1A281C5B629E}" type="datetimeFigureOut">
               <a:rPr lang="fr-FR" smtClean="0"/>
-              <a:t>31/05/2020</a:t>
+              <a:t>02/06/2020</a:t>
             </a:fld>
             <a:endParaRPr lang="fr-FR"/>
           </a:p>
@@ -3446,7 +3446,7 @@
           <a:p>
             <a:fld id="{620FD16B-961D-4EA4-9FCA-1A281C5B629E}" type="datetimeFigureOut">
               <a:rPr lang="fr-FR" smtClean="0"/>
-              <a:t>31/05/2020</a:t>
+              <a:t>02/06/2020</a:t>
             </a:fld>
             <a:endParaRPr lang="fr-FR"/>
           </a:p>
@@ -3644,7 +3644,7 @@
           <a:p>
             <a:fld id="{620FD16B-961D-4EA4-9FCA-1A281C5B629E}" type="datetimeFigureOut">
               <a:rPr lang="fr-FR" smtClean="0"/>
-              <a:t>31/05/2020</a:t>
+              <a:t>02/06/2020</a:t>
             </a:fld>
             <a:endParaRPr lang="fr-FR"/>
           </a:p>
@@ -3919,7 +3919,7 @@
           <a:p>
             <a:fld id="{620FD16B-961D-4EA4-9FCA-1A281C5B629E}" type="datetimeFigureOut">
               <a:rPr lang="fr-FR" smtClean="0"/>
-              <a:t>31/05/2020</a:t>
+              <a:t>02/06/2020</a:t>
             </a:fld>
             <a:endParaRPr lang="fr-FR"/>
           </a:p>
@@ -4184,7 +4184,7 @@
           <a:p>
             <a:fld id="{620FD16B-961D-4EA4-9FCA-1A281C5B629E}" type="datetimeFigureOut">
               <a:rPr lang="fr-FR" smtClean="0"/>
-              <a:t>31/05/2020</a:t>
+              <a:t>02/06/2020</a:t>
             </a:fld>
             <a:endParaRPr lang="fr-FR"/>
           </a:p>
@@ -4596,7 +4596,7 @@
           <a:p>
             <a:fld id="{620FD16B-961D-4EA4-9FCA-1A281C5B629E}" type="datetimeFigureOut">
               <a:rPr lang="fr-FR" smtClean="0"/>
-              <a:t>31/05/2020</a:t>
+              <a:t>02/06/2020</a:t>
             </a:fld>
             <a:endParaRPr lang="fr-FR"/>
           </a:p>
@@ -4737,7 +4737,7 @@
           <a:p>
             <a:fld id="{620FD16B-961D-4EA4-9FCA-1A281C5B629E}" type="datetimeFigureOut">
               <a:rPr lang="fr-FR" smtClean="0"/>
-              <a:t>31/05/2020</a:t>
+              <a:t>02/06/2020</a:t>
             </a:fld>
             <a:endParaRPr lang="fr-FR"/>
           </a:p>
@@ -4850,7 +4850,7 @@
           <a:p>
             <a:fld id="{620FD16B-961D-4EA4-9FCA-1A281C5B629E}" type="datetimeFigureOut">
               <a:rPr lang="fr-FR" smtClean="0"/>
-              <a:t>31/05/2020</a:t>
+              <a:t>02/06/2020</a:t>
             </a:fld>
             <a:endParaRPr lang="fr-FR"/>
           </a:p>
@@ -5161,7 +5161,7 @@
           <a:p>
             <a:fld id="{620FD16B-961D-4EA4-9FCA-1A281C5B629E}" type="datetimeFigureOut">
               <a:rPr lang="fr-FR" smtClean="0"/>
-              <a:t>31/05/2020</a:t>
+              <a:t>02/06/2020</a:t>
             </a:fld>
             <a:endParaRPr lang="fr-FR"/>
           </a:p>
@@ -5449,7 +5449,7 @@
           <a:p>
             <a:fld id="{620FD16B-961D-4EA4-9FCA-1A281C5B629E}" type="datetimeFigureOut">
               <a:rPr lang="fr-FR" smtClean="0"/>
-              <a:t>31/05/2020</a:t>
+              <a:t>02/06/2020</a:t>
             </a:fld>
             <a:endParaRPr lang="fr-FR"/>
           </a:p>
@@ -5690,7 +5690,7 @@
           <a:p>
             <a:fld id="{620FD16B-961D-4EA4-9FCA-1A281C5B629E}" type="datetimeFigureOut">
               <a:rPr lang="fr-FR" smtClean="0"/>
-              <a:t>31/05/2020</a:t>
+              <a:t>02/06/2020</a:t>
             </a:fld>
             <a:endParaRPr lang="fr-FR"/>
           </a:p>
@@ -12313,8 +12313,8 @@
           </a:p>
         </p:txBody>
       </p:sp>
-      <mc:AlternateContent xmlns:mc="http://schemas.openxmlformats.org/markup-compatibility/2006" xmlns:a14="http://schemas.microsoft.com/office/drawing/2010/main">
-        <mc:Choice Requires="a14">
+      <mc:AlternateContent xmlns:mc="http://schemas.openxmlformats.org/markup-compatibility/2006">
+        <mc:Choice xmlns:a14="http://schemas.microsoft.com/office/drawing/2010/main" Requires="a14">
           <p:sp>
             <p:nvSpPr>
               <p:cNvPr id="13" name="Rectangle : coins arrondis 12">
@@ -12364,8 +12364,30 @@
                       </a:schemeClr>
                     </a:solidFill>
                   </a:rPr>
-                  <a:t>Distance Measure</a:t>
+                  <a:t>Distance Measure </a:t>
                 </a:r>
+                <a14:m>
+                  <m:oMath xmlns:m="http://schemas.openxmlformats.org/officeDocument/2006/math">
+                    <m:r>
+                      <a:rPr lang="en-US" i="1" smtClean="0">
+                        <a:solidFill>
+                          <a:schemeClr val="accent1">
+                            <a:lumMod val="50000"/>
+                          </a:schemeClr>
+                        </a:solidFill>
+                        <a:latin typeface="Cambria Math" panose="02040503050406030204" pitchFamily="18" charset="0"/>
+                      </a:rPr>
+                      <m:t>𝐷</m:t>
+                    </m:r>
+                  </m:oMath>
+                </a14:m>
+                <a:endParaRPr lang="en-US" dirty="0">
+                  <a:solidFill>
+                    <a:schemeClr val="accent1">
+                      <a:lumMod val="50000"/>
+                    </a:schemeClr>
+                  </a:solidFill>
+                </a:endParaRPr>
               </a:p>
               <a:p>
                 <a:pPr algn="ctr"/>
@@ -12629,7 +12651,7 @@
             </p:txBody>
           </p:sp>
         </mc:Choice>
-        <mc:Fallback xmlns="">
+        <mc:Fallback>
           <p:sp>
             <p:nvSpPr>
               <p:cNvPr id="13" name="Rectangle : coins arrondis 12">
@@ -12653,7 +12675,7 @@
                 <a:avLst/>
               </a:prstGeom>
               <a:blipFill>
-                <a:blip r:embed="rId15"/>
+                <a:blip r:embed="rId2"/>
                 <a:stretch>
                   <a:fillRect/>
                 </a:stretch>
@@ -12765,8 +12787,8 @@
           </a:fontRef>
         </p:style>
       </p:cxnSp>
-      <mc:AlternateContent xmlns:mc="http://schemas.openxmlformats.org/markup-compatibility/2006" xmlns:a14="http://schemas.microsoft.com/office/drawing/2010/main">
-        <mc:Choice Requires="a14">
+      <mc:AlternateContent xmlns:mc="http://schemas.openxmlformats.org/markup-compatibility/2006">
+        <mc:Choice xmlns:a14="http://schemas.microsoft.com/office/drawing/2010/main" Requires="a14">
           <p:sp>
             <p:nvSpPr>
               <p:cNvPr id="22" name="Rectangle : coins arrondis 21">
@@ -12836,46 +12858,17 @@
                 <a:pPr algn="ctr"/>
                 <a14:m>
                   <m:oMath xmlns:m="http://schemas.openxmlformats.org/officeDocument/2006/math">
-                    <m:sSub>
-                      <m:sSubPr>
-                        <m:ctrlPr>
-                          <a:rPr lang="en-US" sz="1600" i="1" smtClean="0">
-                            <a:solidFill>
-                              <a:schemeClr val="accent4">
-                                <a:lumMod val="50000"/>
-                              </a:schemeClr>
-                            </a:solidFill>
-                            <a:latin typeface="Cambria Math" panose="02040503050406030204" pitchFamily="18" charset="0"/>
-                          </a:rPr>
-                        </m:ctrlPr>
-                      </m:sSubPr>
-                      <m:e>
-                        <m:r>
-                          <a:rPr lang="en-US" sz="1600" b="0" i="1" smtClean="0">
-                            <a:solidFill>
-                              <a:schemeClr val="accent4">
-                                <a:lumMod val="50000"/>
-                              </a:schemeClr>
-                            </a:solidFill>
-                            <a:latin typeface="Cambria Math" panose="02040503050406030204" pitchFamily="18" charset="0"/>
-                          </a:rPr>
-                          <m:t>𝐷</m:t>
-                        </m:r>
-                      </m:e>
-                      <m:sub>
-                        <m:r>
-                          <a:rPr lang="en-US" sz="1600" b="0" i="1" smtClean="0">
-                            <a:solidFill>
-                              <a:schemeClr val="accent4">
-                                <a:lumMod val="50000"/>
-                              </a:schemeClr>
-                            </a:solidFill>
-                            <a:latin typeface="Cambria Math" panose="02040503050406030204" pitchFamily="18" charset="0"/>
-                          </a:rPr>
-                          <m:t>1</m:t>
-                        </m:r>
-                      </m:sub>
-                    </m:sSub>
+                    <m:r>
+                      <a:rPr lang="en-US" sz="1600" i="1" smtClean="0">
+                        <a:solidFill>
+                          <a:schemeClr val="accent4">
+                            <a:lumMod val="50000"/>
+                          </a:schemeClr>
+                        </a:solidFill>
+                        <a:latin typeface="Cambria Math" panose="02040503050406030204" pitchFamily="18" charset="0"/>
+                      </a:rPr>
+                      <m:t>𝐷</m:t>
+                    </m:r>
                     <m:r>
                       <a:rPr lang="en-US" sz="1600" b="0" i="1" smtClean="0">
                         <a:solidFill>
@@ -12915,7 +12908,7 @@
             </p:txBody>
           </p:sp>
         </mc:Choice>
-        <mc:Fallback xmlns="">
+        <mc:Fallback>
           <p:sp>
             <p:nvSpPr>
               <p:cNvPr id="22" name="Rectangle : coins arrondis 21">
@@ -12939,7 +12932,7 @@
                 <a:avLst/>
               </a:prstGeom>
               <a:blipFill>
-                <a:blip r:embed="rId16"/>
+                <a:blip r:embed="rId3"/>
                 <a:stretch>
                   <a:fillRect/>
                 </a:stretch>
@@ -14122,8 +14115,8 @@
         </p:nvSpPr>
         <p:spPr>
           <a:xfrm>
-            <a:off x="1626079" y="1311567"/>
-            <a:ext cx="913648" cy="338554"/>
+            <a:off x="1601233" y="1311567"/>
+            <a:ext cx="963341" cy="338554"/>
           </a:xfrm>
           <a:prstGeom prst="rect">
             <a:avLst/>
@@ -14138,6 +14131,16 @@
           <a:p>
             <a:pPr algn="ctr"/>
             <a:r>
+              <a:rPr lang="en-US" sz="1600" b="1" dirty="0" err="1">
+                <a:solidFill>
+                  <a:schemeClr val="accent2">
+                    <a:lumMod val="50000"/>
+                  </a:schemeClr>
+                </a:solidFill>
+              </a:rPr>
+              <a:t>BiLSTM</a:t>
+            </a:r>
+            <a:r>
               <a:rPr lang="en-US" sz="1600" b="1" dirty="0">
                 <a:solidFill>
                   <a:schemeClr val="accent2">
@@ -14145,7 +14148,7 @@
                   </a:schemeClr>
                 </a:solidFill>
               </a:rPr>
-              <a:t>BLSTM 1</a:t>
+              <a:t> 1</a:t>
             </a:r>
           </a:p>
         </p:txBody>
@@ -15235,8 +15238,8 @@
         </p:nvSpPr>
         <p:spPr>
           <a:xfrm>
-            <a:off x="1602221" y="3960743"/>
-            <a:ext cx="913648" cy="338554"/>
+            <a:off x="1577375" y="3960743"/>
+            <a:ext cx="963341" cy="338554"/>
           </a:xfrm>
           <a:prstGeom prst="rect">
             <a:avLst/>
@@ -15251,6 +15254,16 @@
           <a:p>
             <a:pPr algn="ctr"/>
             <a:r>
+              <a:rPr lang="en-US" sz="1600" b="1" dirty="0" err="1">
+                <a:solidFill>
+                  <a:schemeClr val="accent2">
+                    <a:lumMod val="50000"/>
+                  </a:schemeClr>
+                </a:solidFill>
+              </a:rPr>
+              <a:t>BiLSTM</a:t>
+            </a:r>
+            <a:r>
               <a:rPr lang="en-US" sz="1600" b="1" dirty="0">
                 <a:solidFill>
                   <a:schemeClr val="accent2">
@@ -15258,7 +15271,7 @@
                   </a:schemeClr>
                 </a:solidFill>
               </a:rPr>
-              <a:t>BLSTM 1</a:t>
+              <a:t> 1</a:t>
             </a:r>
           </a:p>
         </p:txBody>
@@ -15277,8 +15290,8 @@
         </p:nvSpPr>
         <p:spPr>
           <a:xfrm>
-            <a:off x="3065740" y="1304166"/>
-            <a:ext cx="913648" cy="338554"/>
+            <a:off x="3040894" y="1304166"/>
+            <a:ext cx="963341" cy="338554"/>
           </a:xfrm>
           <a:prstGeom prst="rect">
             <a:avLst/>
@@ -15293,6 +15306,16 @@
           <a:p>
             <a:pPr algn="ctr"/>
             <a:r>
+              <a:rPr lang="en-US" sz="1600" b="1" dirty="0" err="1">
+                <a:solidFill>
+                  <a:schemeClr val="accent4">
+                    <a:lumMod val="50000"/>
+                  </a:schemeClr>
+                </a:solidFill>
+              </a:rPr>
+              <a:t>BiLSTM</a:t>
+            </a:r>
+            <a:r>
               <a:rPr lang="en-US" sz="1600" b="1" dirty="0">
                 <a:solidFill>
                   <a:schemeClr val="accent4">
@@ -15300,7 +15323,7 @@
                   </a:schemeClr>
                 </a:solidFill>
               </a:rPr>
-              <a:t>BLSTM 2</a:t>
+              <a:t> 2</a:t>
             </a:r>
           </a:p>
         </p:txBody>
@@ -15319,8 +15342,8 @@
         </p:nvSpPr>
         <p:spPr>
           <a:xfrm>
-            <a:off x="3041882" y="3953342"/>
-            <a:ext cx="913648" cy="338554"/>
+            <a:off x="3017036" y="3953342"/>
+            <a:ext cx="963341" cy="338554"/>
           </a:xfrm>
           <a:prstGeom prst="rect">
             <a:avLst/>
@@ -15335,6 +15358,16 @@
           <a:p>
             <a:pPr algn="ctr"/>
             <a:r>
+              <a:rPr lang="en-US" sz="1600" b="1" dirty="0" err="1">
+                <a:solidFill>
+                  <a:schemeClr val="accent4">
+                    <a:lumMod val="50000"/>
+                  </a:schemeClr>
+                </a:solidFill>
+              </a:rPr>
+              <a:t>BiLSTM</a:t>
+            </a:r>
+            <a:r>
               <a:rPr lang="en-US" sz="1600" b="1" dirty="0">
                 <a:solidFill>
                   <a:schemeClr val="accent4">
@@ -15342,7 +15375,7 @@
                   </a:schemeClr>
                 </a:solidFill>
               </a:rPr>
-              <a:t>BLSTM 2</a:t>
+              <a:t> 2</a:t>
             </a:r>
           </a:p>
         </p:txBody>
@@ -15361,8 +15394,8 @@
         </p:nvSpPr>
         <p:spPr>
           <a:xfrm>
-            <a:off x="4540914" y="1314522"/>
-            <a:ext cx="913648" cy="338554"/>
+            <a:off x="4516068" y="1314522"/>
+            <a:ext cx="963341" cy="338554"/>
           </a:xfrm>
           <a:prstGeom prst="rect">
             <a:avLst/>
@@ -15377,6 +15410,16 @@
           <a:p>
             <a:pPr algn="ctr"/>
             <a:r>
+              <a:rPr lang="en-US" sz="1600" b="1" dirty="0" err="1">
+                <a:solidFill>
+                  <a:schemeClr val="accent1">
+                    <a:lumMod val="50000"/>
+                  </a:schemeClr>
+                </a:solidFill>
+              </a:rPr>
+              <a:t>BiLSTM</a:t>
+            </a:r>
+            <a:r>
               <a:rPr lang="en-US" sz="1600" b="1" dirty="0">
                 <a:solidFill>
                   <a:schemeClr val="accent1">
@@ -15384,7 +15427,7 @@
                   </a:schemeClr>
                 </a:solidFill>
               </a:rPr>
-              <a:t>BLSTM 3</a:t>
+              <a:t> 3</a:t>
             </a:r>
           </a:p>
         </p:txBody>
@@ -15403,8 +15446,8 @@
         </p:nvSpPr>
         <p:spPr>
           <a:xfrm>
-            <a:off x="4517056" y="3937064"/>
-            <a:ext cx="913648" cy="338554"/>
+            <a:off x="4492210" y="3937064"/>
+            <a:ext cx="963341" cy="338554"/>
           </a:xfrm>
           <a:prstGeom prst="rect">
             <a:avLst/>
@@ -15419,6 +15462,16 @@
           <a:p>
             <a:pPr algn="ctr"/>
             <a:r>
+              <a:rPr lang="en-US" sz="1600" b="1" dirty="0" err="1">
+                <a:solidFill>
+                  <a:schemeClr val="accent1">
+                    <a:lumMod val="50000"/>
+                  </a:schemeClr>
+                </a:solidFill>
+              </a:rPr>
+              <a:t>BiLSTM</a:t>
+            </a:r>
+            <a:r>
               <a:rPr lang="en-US" sz="1600" b="1" dirty="0">
                 <a:solidFill>
                   <a:schemeClr val="accent1">
@@ -15426,7 +15479,7 @@
                   </a:schemeClr>
                 </a:solidFill>
               </a:rPr>
-              <a:t>BLSTM 3</a:t>
+              <a:t> 3</a:t>
             </a:r>
           </a:p>
         </p:txBody>

</xml_diff>